<commit_message>
end of coursework notes
</commit_message>
<xml_diff>
--- a/Day3/3a_Simulation/Simulation with ADMB.pptx
+++ b/Day3/3a_Simulation/Simulation with ADMB.pptx
@@ -7,9 +7,8 @@
   <p:sldIdLst>
     <p:sldId id="256" r:id="rId2"/>
     <p:sldId id="260" r:id="rId3"/>
-    <p:sldId id="257" r:id="rId4"/>
-    <p:sldId id="261" r:id="rId5"/>
-    <p:sldId id="262" r:id="rId6"/>
+    <p:sldId id="263" r:id="rId4"/>
+    <p:sldId id="262" r:id="rId5"/>
   </p:sldIdLst>
   <p:sldSz cx="12192000" cy="6858000"/>
   <p:notesSz cx="6858000" cy="9144000"/>
@@ -267,7 +266,7 @@
           <a:p>
             <a:fld id="{02E41812-9353-4D94-B8BC-B7250C750C61}" type="datetimeFigureOut">
               <a:rPr lang="en-US" smtClean="0"/>
-              <a:t>3/14/2018</a:t>
+              <a:t>3/15/2018</a:t>
             </a:fld>
             <a:endParaRPr lang="en-US"/>
           </a:p>
@@ -465,7 +464,7 @@
           <a:p>
             <a:fld id="{02E41812-9353-4D94-B8BC-B7250C750C61}" type="datetimeFigureOut">
               <a:rPr lang="en-US" smtClean="0"/>
-              <a:t>3/14/2018</a:t>
+              <a:t>3/15/2018</a:t>
             </a:fld>
             <a:endParaRPr lang="en-US"/>
           </a:p>
@@ -673,7 +672,7 @@
           <a:p>
             <a:fld id="{02E41812-9353-4D94-B8BC-B7250C750C61}" type="datetimeFigureOut">
               <a:rPr lang="en-US" smtClean="0"/>
-              <a:t>3/14/2018</a:t>
+              <a:t>3/15/2018</a:t>
             </a:fld>
             <a:endParaRPr lang="en-US"/>
           </a:p>
@@ -903,7 +902,7 @@
           <a:p>
             <a:fld id="{02E41812-9353-4D94-B8BC-B7250C750C61}" type="datetimeFigureOut">
               <a:rPr lang="en-US" smtClean="0"/>
-              <a:t>3/14/2018</a:t>
+              <a:t>3/15/2018</a:t>
             </a:fld>
             <a:endParaRPr lang="en-US"/>
           </a:p>
@@ -1178,7 +1177,7 @@
           <a:p>
             <a:fld id="{02E41812-9353-4D94-B8BC-B7250C750C61}" type="datetimeFigureOut">
               <a:rPr lang="en-US" smtClean="0"/>
-              <a:t>3/14/2018</a:t>
+              <a:t>3/15/2018</a:t>
             </a:fld>
             <a:endParaRPr lang="en-US"/>
           </a:p>
@@ -1443,7 +1442,7 @@
           <a:p>
             <a:fld id="{02E41812-9353-4D94-B8BC-B7250C750C61}" type="datetimeFigureOut">
               <a:rPr lang="en-US" smtClean="0"/>
-              <a:t>3/14/2018</a:t>
+              <a:t>3/15/2018</a:t>
             </a:fld>
             <a:endParaRPr lang="en-US"/>
           </a:p>
@@ -1855,7 +1854,7 @@
           <a:p>
             <a:fld id="{02E41812-9353-4D94-B8BC-B7250C750C61}" type="datetimeFigureOut">
               <a:rPr lang="en-US" smtClean="0"/>
-              <a:t>3/14/2018</a:t>
+              <a:t>3/15/2018</a:t>
             </a:fld>
             <a:endParaRPr lang="en-US"/>
           </a:p>
@@ -1996,7 +1995,7 @@
           <a:p>
             <a:fld id="{02E41812-9353-4D94-B8BC-B7250C750C61}" type="datetimeFigureOut">
               <a:rPr lang="en-US" smtClean="0"/>
-              <a:t>3/14/2018</a:t>
+              <a:t>3/15/2018</a:t>
             </a:fld>
             <a:endParaRPr lang="en-US"/>
           </a:p>
@@ -2109,7 +2108,7 @@
           <a:p>
             <a:fld id="{02E41812-9353-4D94-B8BC-B7250C750C61}" type="datetimeFigureOut">
               <a:rPr lang="en-US" smtClean="0"/>
-              <a:t>3/14/2018</a:t>
+              <a:t>3/15/2018</a:t>
             </a:fld>
             <a:endParaRPr lang="en-US"/>
           </a:p>
@@ -2420,7 +2419,7 @@
           <a:p>
             <a:fld id="{02E41812-9353-4D94-B8BC-B7250C750C61}" type="datetimeFigureOut">
               <a:rPr lang="en-US" smtClean="0"/>
-              <a:t>3/14/2018</a:t>
+              <a:t>3/15/2018</a:t>
             </a:fld>
             <a:endParaRPr lang="en-US"/>
           </a:p>
@@ -2708,7 +2707,7 @@
           <a:p>
             <a:fld id="{02E41812-9353-4D94-B8BC-B7250C750C61}" type="datetimeFigureOut">
               <a:rPr lang="en-US" smtClean="0"/>
-              <a:t>3/14/2018</a:t>
+              <a:t>3/15/2018</a:t>
             </a:fld>
             <a:endParaRPr lang="en-US"/>
           </a:p>
@@ -2949,7 +2948,7 @@
           <a:p>
             <a:fld id="{02E41812-9353-4D94-B8BC-B7250C750C61}" type="datetimeFigureOut">
               <a:rPr lang="en-US" smtClean="0"/>
-              <a:t>3/14/2018</a:t>
+              <a:t>3/15/2018</a:t>
             </a:fld>
             <a:endParaRPr lang="en-US"/>
           </a:p>
@@ -4267,128 +4266,589 @@
       </p:grpSpPr>
       <p:sp>
         <p:nvSpPr>
-          <p:cNvPr id="2" name="Title 1">
-            <a:extLst>
-              <a:ext uri="{FF2B5EF4-FFF2-40B4-BE49-F238E27FC236}">
-                <a16:creationId xmlns:a16="http://schemas.microsoft.com/office/drawing/2014/main" id="{10DA8F8F-591B-40B3-974F-87E453280CC7}"/>
-              </a:ext>
-            </a:extLst>
-          </p:cNvPr>
-          <p:cNvSpPr>
-            <a:spLocks noGrp="1"/>
-          </p:cNvSpPr>
-          <p:nvPr>
-            <p:ph type="title"/>
-          </p:nvPr>
-        </p:nvSpPr>
-        <p:spPr/>
-        <p:txBody>
-          <a:bodyPr/>
-          <a:lstStyle/>
-          <a:p>
-            <a:r>
-              <a:rPr lang="en-US" dirty="0"/>
-              <a:t>Work with R</a:t>
-            </a:r>
-          </a:p>
-        </p:txBody>
-      </p:sp>
-      <p:sp>
-        <p:nvSpPr>
-          <p:cNvPr id="3" name="Content Placeholder 2">
-            <a:extLst>
-              <a:ext uri="{FF2B5EF4-FFF2-40B4-BE49-F238E27FC236}">
-                <a16:creationId xmlns:a16="http://schemas.microsoft.com/office/drawing/2014/main" id="{8D445969-73F3-4906-B4D0-2FF62F9705B3}"/>
-              </a:ext>
-            </a:extLst>
-          </p:cNvPr>
-          <p:cNvSpPr>
-            <a:spLocks noGrp="1"/>
-          </p:cNvSpPr>
-          <p:nvPr>
-            <p:ph idx="1"/>
-          </p:nvPr>
-        </p:nvSpPr>
-        <p:spPr/>
-        <p:txBody>
-          <a:bodyPr/>
-          <a:lstStyle/>
-          <a:p>
-            <a:pPr marL="514350" indent="-514350">
-              <a:buFont typeface="+mj-lt"/>
-              <a:buAutoNum type="arabicParenR"/>
-            </a:pPr>
-            <a:r>
-              <a:rPr lang="en-US" dirty="0"/>
-              <a:t>Write deterministic operating model in R</a:t>
-            </a:r>
-          </a:p>
-          <a:p>
-            <a:pPr marL="514350" indent="-514350">
-              <a:buFont typeface="+mj-lt"/>
-              <a:buAutoNum type="arabicParenR"/>
-            </a:pPr>
-            <a:r>
-              <a:rPr lang="en-US" dirty="0"/>
-              <a:t>Generate deterministic data and write .DAT file</a:t>
-            </a:r>
-          </a:p>
-          <a:p>
-            <a:pPr marL="514350" indent="-514350">
-              <a:buFont typeface="+mj-lt"/>
-              <a:buAutoNum type="arabicParenR"/>
-            </a:pPr>
-            <a:r>
-              <a:rPr lang="en-US" dirty="0"/>
-              <a:t>Set up starting values and error terms</a:t>
-            </a:r>
-          </a:p>
-          <a:p>
-            <a:pPr marL="514350" indent="-514350">
-              <a:buFont typeface="+mj-lt"/>
-              <a:buAutoNum type="arabicParenR"/>
-            </a:pPr>
-            <a:r>
-              <a:rPr lang="en-US" dirty="0"/>
-              <a:t>Run ADMB program without simulation component</a:t>
-            </a:r>
-          </a:p>
-          <a:p>
-            <a:pPr marL="514350" indent="-514350">
-              <a:buFont typeface="+mj-lt"/>
-              <a:buAutoNum type="arabicParenR"/>
-            </a:pPr>
-            <a:r>
-              <a:rPr lang="en-US" dirty="0"/>
-              <a:t>Run ADMB program with simulation component – adding process and observation error</a:t>
-            </a:r>
-          </a:p>
-          <a:p>
-            <a:pPr marL="514350" indent="-514350">
-              <a:buFont typeface="+mj-lt"/>
-              <a:buAutoNum type="arabicParenR"/>
-            </a:pPr>
-            <a:r>
-              <a:rPr lang="en-US" dirty="0"/>
-              <a:t>Use R to iterate this process, run several iterations, and compare with deterministic</a:t>
-            </a:r>
-          </a:p>
-          <a:p>
-            <a:pPr marL="514350" indent="-514350">
-              <a:buFont typeface="+mj-lt"/>
-              <a:buAutoNum type="arabicParenR"/>
-            </a:pPr>
-            <a:r>
-              <a:rPr lang="en-US" dirty="0"/>
-              <a:t>Visualize results</a:t>
-            </a:r>
-          </a:p>
-        </p:txBody>
-      </p:sp>
+          <p:cNvPr id="4" name="Oval 3">
+            <a:extLst>
+              <a:ext uri="{FF2B5EF4-FFF2-40B4-BE49-F238E27FC236}">
+                <a16:creationId xmlns:a16="http://schemas.microsoft.com/office/drawing/2014/main" id="{C7B4E4E7-A20E-4D98-B225-2F45975B6920}"/>
+              </a:ext>
+            </a:extLst>
+          </p:cNvPr>
+          <p:cNvSpPr/>
+          <p:nvPr/>
+        </p:nvSpPr>
+        <p:spPr>
+          <a:xfrm>
+            <a:off x="869245" y="1162755"/>
+            <a:ext cx="2032000" cy="1332089"/>
+          </a:xfrm>
+          <a:prstGeom prst="ellipse">
+            <a:avLst/>
+          </a:prstGeom>
+          <a:noFill/>
+        </p:spPr>
+        <p:style>
+          <a:lnRef idx="2">
+            <a:schemeClr val="accent1">
+              <a:shade val="50000"/>
+            </a:schemeClr>
+          </a:lnRef>
+          <a:fillRef idx="1">
+            <a:schemeClr val="accent1"/>
+          </a:fillRef>
+          <a:effectRef idx="0">
+            <a:schemeClr val="accent1"/>
+          </a:effectRef>
+          <a:fontRef idx="minor">
+            <a:schemeClr val="lt1"/>
+          </a:fontRef>
+        </p:style>
+        <p:txBody>
+          <a:bodyPr rtlCol="0" anchor="ctr"/>
+          <a:lstStyle/>
+          <a:p>
+            <a:pPr algn="ctr"/>
+            <a:r>
+              <a:rPr lang="en-US" dirty="0">
+                <a:solidFill>
+                  <a:schemeClr val="tx1"/>
+                </a:solidFill>
+              </a:rPr>
+              <a:t>Model.dat</a:t>
+            </a:r>
+          </a:p>
+          <a:p>
+            <a:pPr algn="ctr"/>
+            <a:r>
+              <a:rPr lang="en-US" dirty="0">
+                <a:solidFill>
+                  <a:schemeClr val="tx1"/>
+                </a:solidFill>
+              </a:rPr>
+              <a:t>(List names of files to read in)</a:t>
+            </a:r>
+          </a:p>
+        </p:txBody>
+      </p:sp>
+      <p:sp>
+        <p:nvSpPr>
+          <p:cNvPr id="5" name="Oval 4">
+            <a:extLst>
+              <a:ext uri="{FF2B5EF4-FFF2-40B4-BE49-F238E27FC236}">
+                <a16:creationId xmlns:a16="http://schemas.microsoft.com/office/drawing/2014/main" id="{51597CD8-15CB-43ED-AB05-2718460399ED}"/>
+              </a:ext>
+            </a:extLst>
+          </p:cNvPr>
+          <p:cNvSpPr/>
+          <p:nvPr/>
+        </p:nvSpPr>
+        <p:spPr>
+          <a:xfrm>
+            <a:off x="869245" y="5029200"/>
+            <a:ext cx="2032000" cy="1332089"/>
+          </a:xfrm>
+          <a:prstGeom prst="ellipse">
+            <a:avLst/>
+          </a:prstGeom>
+          <a:solidFill>
+            <a:schemeClr val="accent1">
+              <a:lumMod val="40000"/>
+              <a:lumOff val="60000"/>
+            </a:schemeClr>
+          </a:solidFill>
+        </p:spPr>
+        <p:style>
+          <a:lnRef idx="2">
+            <a:schemeClr val="accent1">
+              <a:shade val="50000"/>
+            </a:schemeClr>
+          </a:lnRef>
+          <a:fillRef idx="1">
+            <a:schemeClr val="accent1"/>
+          </a:fillRef>
+          <a:effectRef idx="0">
+            <a:schemeClr val="accent1"/>
+          </a:effectRef>
+          <a:fontRef idx="minor">
+            <a:schemeClr val="lt1"/>
+          </a:fontRef>
+        </p:style>
+        <p:txBody>
+          <a:bodyPr rtlCol="0" anchor="ctr"/>
+          <a:lstStyle/>
+          <a:p>
+            <a:pPr algn="ctr"/>
+            <a:r>
+              <a:rPr lang="en-US" dirty="0" err="1">
+                <a:solidFill>
+                  <a:schemeClr val="tx1"/>
+                </a:solidFill>
+              </a:rPr>
+              <a:t>Model.tpl</a:t>
+            </a:r>
+            <a:endParaRPr lang="en-US" dirty="0">
+              <a:solidFill>
+                <a:schemeClr val="tx1"/>
+              </a:solidFill>
+            </a:endParaRPr>
+          </a:p>
+        </p:txBody>
+      </p:sp>
+      <p:sp>
+        <p:nvSpPr>
+          <p:cNvPr id="6" name="Oval 5">
+            <a:extLst>
+              <a:ext uri="{FF2B5EF4-FFF2-40B4-BE49-F238E27FC236}">
+                <a16:creationId xmlns:a16="http://schemas.microsoft.com/office/drawing/2014/main" id="{84B7DC94-DBFD-41FA-9EAD-A7B885E72596}"/>
+              </a:ext>
+            </a:extLst>
+          </p:cNvPr>
+          <p:cNvSpPr/>
+          <p:nvPr/>
+        </p:nvSpPr>
+        <p:spPr>
+          <a:xfrm>
+            <a:off x="3832578" y="530576"/>
+            <a:ext cx="2263422" cy="1332089"/>
+          </a:xfrm>
+          <a:prstGeom prst="ellipse">
+            <a:avLst/>
+          </a:prstGeom>
+          <a:noFill/>
+        </p:spPr>
+        <p:style>
+          <a:lnRef idx="2">
+            <a:schemeClr val="accent1">
+              <a:shade val="50000"/>
+            </a:schemeClr>
+          </a:lnRef>
+          <a:fillRef idx="1">
+            <a:schemeClr val="accent1"/>
+          </a:fillRef>
+          <a:effectRef idx="0">
+            <a:schemeClr val="accent1"/>
+          </a:effectRef>
+          <a:fontRef idx="minor">
+            <a:schemeClr val="lt1"/>
+          </a:fontRef>
+        </p:style>
+        <p:txBody>
+          <a:bodyPr rtlCol="0" anchor="ctr"/>
+          <a:lstStyle/>
+          <a:p>
+            <a:pPr algn="ctr"/>
+            <a:r>
+              <a:rPr lang="en-US" dirty="0">
+                <a:solidFill>
+                  <a:schemeClr val="tx1"/>
+                </a:solidFill>
+              </a:rPr>
+              <a:t>Stockdata.dat</a:t>
+            </a:r>
+          </a:p>
+          <a:p>
+            <a:pPr algn="ctr"/>
+            <a:r>
+              <a:rPr lang="en-US" dirty="0">
+                <a:solidFill>
+                  <a:schemeClr val="tx1"/>
+                </a:solidFill>
+              </a:rPr>
+              <a:t>(Real data)</a:t>
+            </a:r>
+          </a:p>
+        </p:txBody>
+      </p:sp>
+      <p:sp>
+        <p:nvSpPr>
+          <p:cNvPr id="7" name="Oval 6">
+            <a:extLst>
+              <a:ext uri="{FF2B5EF4-FFF2-40B4-BE49-F238E27FC236}">
+                <a16:creationId xmlns:a16="http://schemas.microsoft.com/office/drawing/2014/main" id="{4D28B3DE-CDF3-4FED-95E1-E899B0D4965E}"/>
+              </a:ext>
+            </a:extLst>
+          </p:cNvPr>
+          <p:cNvSpPr/>
+          <p:nvPr/>
+        </p:nvSpPr>
+        <p:spPr>
+          <a:xfrm>
+            <a:off x="3832579" y="1992489"/>
+            <a:ext cx="2263421" cy="1332089"/>
+          </a:xfrm>
+          <a:prstGeom prst="ellipse">
+            <a:avLst/>
+          </a:prstGeom>
+          <a:solidFill>
+            <a:schemeClr val="accent6">
+              <a:lumMod val="40000"/>
+              <a:lumOff val="60000"/>
+            </a:schemeClr>
+          </a:solidFill>
+        </p:spPr>
+        <p:style>
+          <a:lnRef idx="2">
+            <a:schemeClr val="accent1">
+              <a:shade val="50000"/>
+            </a:schemeClr>
+          </a:lnRef>
+          <a:fillRef idx="1">
+            <a:schemeClr val="accent1"/>
+          </a:fillRef>
+          <a:effectRef idx="0">
+            <a:schemeClr val="accent1"/>
+          </a:effectRef>
+          <a:fontRef idx="minor">
+            <a:schemeClr val="lt1"/>
+          </a:fontRef>
+        </p:style>
+        <p:txBody>
+          <a:bodyPr rtlCol="0" anchor="ctr"/>
+          <a:lstStyle/>
+          <a:p>
+            <a:pPr algn="ctr"/>
+            <a:r>
+              <a:rPr lang="en-US" dirty="0" err="1">
+                <a:solidFill>
+                  <a:schemeClr val="tx1"/>
+                </a:solidFill>
+              </a:rPr>
+              <a:t>Simdata.ctl</a:t>
+            </a:r>
+            <a:endParaRPr lang="en-US" dirty="0">
+              <a:solidFill>
+                <a:schemeClr val="tx1"/>
+              </a:solidFill>
+            </a:endParaRPr>
+          </a:p>
+          <a:p>
+            <a:pPr algn="ctr"/>
+            <a:r>
+              <a:rPr lang="en-US" dirty="0">
+                <a:solidFill>
+                  <a:schemeClr val="tx1"/>
+                </a:solidFill>
+              </a:rPr>
+              <a:t>(True values)</a:t>
+            </a:r>
+          </a:p>
+        </p:txBody>
+      </p:sp>
+      <p:cxnSp>
+        <p:nvCxnSpPr>
+          <p:cNvPr id="9" name="Straight Arrow Connector 8">
+            <a:extLst>
+              <a:ext uri="{FF2B5EF4-FFF2-40B4-BE49-F238E27FC236}">
+                <a16:creationId xmlns:a16="http://schemas.microsoft.com/office/drawing/2014/main" id="{FBE1A2E9-BDAD-495E-8FB7-301B416A5876}"/>
+              </a:ext>
+            </a:extLst>
+          </p:cNvPr>
+          <p:cNvCxnSpPr>
+            <a:stCxn id="6" idx="2"/>
+            <a:endCxn id="4" idx="6"/>
+          </p:cNvCxnSpPr>
+          <p:nvPr/>
+        </p:nvCxnSpPr>
+        <p:spPr>
+          <a:xfrm flipH="1">
+            <a:off x="2901245" y="1196621"/>
+            <a:ext cx="931333" cy="632179"/>
+          </a:xfrm>
+          <a:prstGeom prst="straightConnector1">
+            <a:avLst/>
+          </a:prstGeom>
+          <a:ln w="38100">
+            <a:solidFill>
+              <a:schemeClr val="tx1"/>
+            </a:solidFill>
+            <a:tailEnd type="triangle"/>
+          </a:ln>
+        </p:spPr>
+        <p:style>
+          <a:lnRef idx="1">
+            <a:schemeClr val="accent1"/>
+          </a:lnRef>
+          <a:fillRef idx="0">
+            <a:schemeClr val="accent1"/>
+          </a:fillRef>
+          <a:effectRef idx="0">
+            <a:schemeClr val="accent1"/>
+          </a:effectRef>
+          <a:fontRef idx="minor">
+            <a:schemeClr val="tx1"/>
+          </a:fontRef>
+        </p:style>
+      </p:cxnSp>
+      <p:cxnSp>
+        <p:nvCxnSpPr>
+          <p:cNvPr id="10" name="Straight Arrow Connector 9">
+            <a:extLst>
+              <a:ext uri="{FF2B5EF4-FFF2-40B4-BE49-F238E27FC236}">
+                <a16:creationId xmlns:a16="http://schemas.microsoft.com/office/drawing/2014/main" id="{0F6CDA67-3E01-41E9-ADD6-733DCB513E18}"/>
+              </a:ext>
+            </a:extLst>
+          </p:cNvPr>
+          <p:cNvCxnSpPr>
+            <a:cxnSpLocks/>
+            <a:stCxn id="7" idx="2"/>
+            <a:endCxn id="4" idx="6"/>
+          </p:cNvCxnSpPr>
+          <p:nvPr/>
+        </p:nvCxnSpPr>
+        <p:spPr>
+          <a:xfrm flipH="1" flipV="1">
+            <a:off x="2901245" y="1828800"/>
+            <a:ext cx="931334" cy="829734"/>
+          </a:xfrm>
+          <a:prstGeom prst="straightConnector1">
+            <a:avLst/>
+          </a:prstGeom>
+          <a:ln w="38100">
+            <a:solidFill>
+              <a:schemeClr val="tx1"/>
+            </a:solidFill>
+            <a:tailEnd type="triangle"/>
+          </a:ln>
+        </p:spPr>
+        <p:style>
+          <a:lnRef idx="1">
+            <a:schemeClr val="accent1"/>
+          </a:lnRef>
+          <a:fillRef idx="0">
+            <a:schemeClr val="accent1"/>
+          </a:fillRef>
+          <a:effectRef idx="0">
+            <a:schemeClr val="accent1"/>
+          </a:effectRef>
+          <a:fontRef idx="minor">
+            <a:schemeClr val="tx1"/>
+          </a:fontRef>
+        </p:style>
+      </p:cxnSp>
+      <p:cxnSp>
+        <p:nvCxnSpPr>
+          <p:cNvPr id="13" name="Straight Arrow Connector 12">
+            <a:extLst>
+              <a:ext uri="{FF2B5EF4-FFF2-40B4-BE49-F238E27FC236}">
+                <a16:creationId xmlns:a16="http://schemas.microsoft.com/office/drawing/2014/main" id="{85F97E5C-E6B6-42DA-AD15-E36B48C4F4F1}"/>
+              </a:ext>
+            </a:extLst>
+          </p:cNvPr>
+          <p:cNvCxnSpPr>
+            <a:cxnSpLocks/>
+            <a:stCxn id="4" idx="4"/>
+            <a:endCxn id="5" idx="0"/>
+          </p:cNvCxnSpPr>
+          <p:nvPr/>
+        </p:nvCxnSpPr>
+        <p:spPr>
+          <a:xfrm>
+            <a:off x="1885245" y="2494844"/>
+            <a:ext cx="0" cy="2534356"/>
+          </a:xfrm>
+          <a:prstGeom prst="straightConnector1">
+            <a:avLst/>
+          </a:prstGeom>
+          <a:ln w="38100">
+            <a:solidFill>
+              <a:schemeClr val="tx1"/>
+            </a:solidFill>
+            <a:tailEnd type="triangle"/>
+          </a:ln>
+        </p:spPr>
+        <p:style>
+          <a:lnRef idx="1">
+            <a:schemeClr val="accent1"/>
+          </a:lnRef>
+          <a:fillRef idx="0">
+            <a:schemeClr val="accent1"/>
+          </a:fillRef>
+          <a:effectRef idx="0">
+            <a:schemeClr val="accent1"/>
+          </a:effectRef>
+          <a:fontRef idx="minor">
+            <a:schemeClr val="tx1"/>
+          </a:fontRef>
+        </p:style>
+      </p:cxnSp>
+      <p:sp>
+        <p:nvSpPr>
+          <p:cNvPr id="18" name="Oval 17">
+            <a:extLst>
+              <a:ext uri="{FF2B5EF4-FFF2-40B4-BE49-F238E27FC236}">
+                <a16:creationId xmlns:a16="http://schemas.microsoft.com/office/drawing/2014/main" id="{C2E97587-8E82-4A77-88E5-9654781E2C28}"/>
+              </a:ext>
+            </a:extLst>
+          </p:cNvPr>
+          <p:cNvSpPr/>
+          <p:nvPr/>
+        </p:nvSpPr>
+        <p:spPr>
+          <a:xfrm>
+            <a:off x="2287577" y="3290713"/>
+            <a:ext cx="2263421" cy="1332089"/>
+          </a:xfrm>
+          <a:prstGeom prst="ellipse">
+            <a:avLst/>
+          </a:prstGeom>
+          <a:solidFill>
+            <a:schemeClr val="accent6">
+              <a:lumMod val="40000"/>
+              <a:lumOff val="60000"/>
+            </a:schemeClr>
+          </a:solidFill>
+        </p:spPr>
+        <p:style>
+          <a:lnRef idx="2">
+            <a:schemeClr val="accent1">
+              <a:shade val="50000"/>
+            </a:schemeClr>
+          </a:lnRef>
+          <a:fillRef idx="1">
+            <a:schemeClr val="accent1"/>
+          </a:fillRef>
+          <a:effectRef idx="0">
+            <a:schemeClr val="accent1"/>
+          </a:effectRef>
+          <a:fontRef idx="minor">
+            <a:schemeClr val="lt1"/>
+          </a:fontRef>
+        </p:style>
+        <p:txBody>
+          <a:bodyPr rtlCol="0" anchor="ctr"/>
+          <a:lstStyle/>
+          <a:p>
+            <a:pPr algn="ctr"/>
+            <a:r>
+              <a:rPr lang="en-US" dirty="0">
+                <a:solidFill>
+                  <a:schemeClr val="tx1"/>
+                </a:solidFill>
+              </a:rPr>
+              <a:t>-sim</a:t>
+            </a:r>
+          </a:p>
+          <a:p>
+            <a:pPr algn="ctr"/>
+            <a:r>
+              <a:rPr lang="en-US" dirty="0">
+                <a:solidFill>
+                  <a:schemeClr val="tx1"/>
+                </a:solidFill>
+              </a:rPr>
+              <a:t>Generates data from .</a:t>
+            </a:r>
+            <a:r>
+              <a:rPr lang="en-US" dirty="0" err="1">
+                <a:solidFill>
+                  <a:schemeClr val="tx1"/>
+                </a:solidFill>
+              </a:rPr>
+              <a:t>ctl</a:t>
+            </a:r>
+            <a:endParaRPr lang="en-US" dirty="0">
+              <a:solidFill>
+                <a:schemeClr val="tx1"/>
+              </a:solidFill>
+            </a:endParaRPr>
+          </a:p>
+        </p:txBody>
+      </p:sp>
+      <p:cxnSp>
+        <p:nvCxnSpPr>
+          <p:cNvPr id="19" name="Straight Arrow Connector 18">
+            <a:extLst>
+              <a:ext uri="{FF2B5EF4-FFF2-40B4-BE49-F238E27FC236}">
+                <a16:creationId xmlns:a16="http://schemas.microsoft.com/office/drawing/2014/main" id="{AA23F4F0-2A5E-4EE4-9E1F-1813096F0E13}"/>
+              </a:ext>
+            </a:extLst>
+          </p:cNvPr>
+          <p:cNvCxnSpPr>
+            <a:cxnSpLocks/>
+            <a:stCxn id="4" idx="4"/>
+            <a:endCxn id="18" idx="0"/>
+          </p:cNvCxnSpPr>
+          <p:nvPr/>
+        </p:nvCxnSpPr>
+        <p:spPr>
+          <a:xfrm>
+            <a:off x="1885245" y="2494844"/>
+            <a:ext cx="1534043" cy="795869"/>
+          </a:xfrm>
+          <a:prstGeom prst="straightConnector1">
+            <a:avLst/>
+          </a:prstGeom>
+          <a:ln w="38100">
+            <a:solidFill>
+              <a:schemeClr val="tx1"/>
+            </a:solidFill>
+            <a:tailEnd type="triangle"/>
+          </a:ln>
+        </p:spPr>
+        <p:style>
+          <a:lnRef idx="1">
+            <a:schemeClr val="accent1"/>
+          </a:lnRef>
+          <a:fillRef idx="0">
+            <a:schemeClr val="accent1"/>
+          </a:fillRef>
+          <a:effectRef idx="0">
+            <a:schemeClr val="accent1"/>
+          </a:effectRef>
+          <a:fontRef idx="minor">
+            <a:schemeClr val="tx1"/>
+          </a:fontRef>
+        </p:style>
+      </p:cxnSp>
+      <p:cxnSp>
+        <p:nvCxnSpPr>
+          <p:cNvPr id="22" name="Straight Arrow Connector 21">
+            <a:extLst>
+              <a:ext uri="{FF2B5EF4-FFF2-40B4-BE49-F238E27FC236}">
+                <a16:creationId xmlns:a16="http://schemas.microsoft.com/office/drawing/2014/main" id="{86E65C7B-887C-4F46-B966-AF98DE8A125C}"/>
+              </a:ext>
+            </a:extLst>
+          </p:cNvPr>
+          <p:cNvCxnSpPr>
+            <a:cxnSpLocks/>
+            <a:stCxn id="18" idx="4"/>
+            <a:endCxn id="5" idx="7"/>
+          </p:cNvCxnSpPr>
+          <p:nvPr/>
+        </p:nvCxnSpPr>
+        <p:spPr>
+          <a:xfrm flipH="1">
+            <a:off x="2603665" y="4622802"/>
+            <a:ext cx="815623" cy="601478"/>
+          </a:xfrm>
+          <a:prstGeom prst="straightConnector1">
+            <a:avLst/>
+          </a:prstGeom>
+          <a:ln w="38100">
+            <a:solidFill>
+              <a:schemeClr val="tx1"/>
+            </a:solidFill>
+            <a:tailEnd type="triangle"/>
+          </a:ln>
+        </p:spPr>
+        <p:style>
+          <a:lnRef idx="1">
+            <a:schemeClr val="accent1"/>
+          </a:lnRef>
+          <a:fillRef idx="0">
+            <a:schemeClr val="accent1"/>
+          </a:fillRef>
+          <a:effectRef idx="0">
+            <a:schemeClr val="accent1"/>
+          </a:effectRef>
+          <a:fontRef idx="minor">
+            <a:schemeClr val="tx1"/>
+          </a:fontRef>
+        </p:style>
+      </p:cxnSp>
     </p:spTree>
     <p:extLst>
       <p:ext uri="{BB962C8B-B14F-4D97-AF65-F5344CB8AC3E}">
-        <p14:creationId xmlns:p14="http://schemas.microsoft.com/office/powerpoint/2010/main" val="710683235"/>
+        <p14:creationId xmlns:p14="http://schemas.microsoft.com/office/powerpoint/2010/main" val="1517224200"/>
       </p:ext>
     </p:extLst>
   </p:cSld>
@@ -4399,108 +4859,6 @@
 </file>
 
 <file path=ppt/slides/slide4.xml><?xml version="1.0" encoding="utf-8"?>
-<p:sld xmlns:a="http://schemas.openxmlformats.org/drawingml/2006/main" xmlns:r="http://schemas.openxmlformats.org/officeDocument/2006/relationships" xmlns:p="http://schemas.openxmlformats.org/presentationml/2006/main">
-  <p:cSld>
-    <p:spTree>
-      <p:nvGrpSpPr>
-        <p:cNvPr id="1" name=""/>
-        <p:cNvGrpSpPr/>
-        <p:nvPr/>
-      </p:nvGrpSpPr>
-      <p:grpSpPr>
-        <a:xfrm>
-          <a:off x="0" y="0"/>
-          <a:ext cx="0" cy="0"/>
-          <a:chOff x="0" y="0"/>
-          <a:chExt cx="0" cy="0"/>
-        </a:xfrm>
-      </p:grpSpPr>
-      <p:sp>
-        <p:nvSpPr>
-          <p:cNvPr id="2" name="Title 1">
-            <a:extLst>
-              <a:ext uri="{FF2B5EF4-FFF2-40B4-BE49-F238E27FC236}">
-                <a16:creationId xmlns:a16="http://schemas.microsoft.com/office/drawing/2014/main" id="{2356D5F6-65EB-49E0-BFFA-72CDDD19C928}"/>
-              </a:ext>
-            </a:extLst>
-          </p:cNvPr>
-          <p:cNvSpPr>
-            <a:spLocks noGrp="1"/>
-          </p:cNvSpPr>
-          <p:nvPr>
-            <p:ph type="title"/>
-          </p:nvPr>
-        </p:nvSpPr>
-        <p:spPr/>
-        <p:txBody>
-          <a:bodyPr/>
-          <a:lstStyle/>
-          <a:p>
-            <a:r>
-              <a:rPr lang="en-US" dirty="0"/>
-              <a:t>Work only with ADMB</a:t>
-            </a:r>
-          </a:p>
-        </p:txBody>
-      </p:sp>
-      <p:sp>
-        <p:nvSpPr>
-          <p:cNvPr id="3" name="Content Placeholder 2">
-            <a:extLst>
-              <a:ext uri="{FF2B5EF4-FFF2-40B4-BE49-F238E27FC236}">
-                <a16:creationId xmlns:a16="http://schemas.microsoft.com/office/drawing/2014/main" id="{DE5C66C8-A66C-44AC-AD6C-3E0BB06121CD}"/>
-              </a:ext>
-            </a:extLst>
-          </p:cNvPr>
-          <p:cNvSpPr>
-            <a:spLocks noGrp="1"/>
-          </p:cNvSpPr>
-          <p:nvPr>
-            <p:ph idx="1"/>
-          </p:nvPr>
-        </p:nvSpPr>
-        <p:spPr/>
-        <p:txBody>
-          <a:bodyPr/>
-          <a:lstStyle/>
-          <a:p>
-            <a:r>
-              <a:rPr lang="en-US" dirty="0"/>
-              <a:t>Work without a .DAT file to simulate data in ADMB</a:t>
-            </a:r>
-          </a:p>
-          <a:p>
-            <a:r>
-              <a:rPr lang="en-US" dirty="0"/>
-              <a:t>Estimate population parameters</a:t>
-            </a:r>
-          </a:p>
-          <a:p>
-            <a:r>
-              <a:rPr lang="en-US" dirty="0"/>
-              <a:t>Compare </a:t>
-            </a:r>
-            <a:r>
-              <a:rPr lang="en-US"/>
-              <a:t>results in R</a:t>
-            </a:r>
-          </a:p>
-        </p:txBody>
-      </p:sp>
-    </p:spTree>
-    <p:extLst>
-      <p:ext uri="{BB962C8B-B14F-4D97-AF65-F5344CB8AC3E}">
-        <p14:creationId xmlns:p14="http://schemas.microsoft.com/office/powerpoint/2010/main" val="419947026"/>
-      </p:ext>
-    </p:extLst>
-  </p:cSld>
-  <p:clrMapOvr>
-    <a:masterClrMapping/>
-  </p:clrMapOvr>
-</p:sld>
-</file>
-
-<file path=ppt/slides/slide5.xml><?xml version="1.0" encoding="utf-8"?>
 <p:sld xmlns:a="http://schemas.openxmlformats.org/drawingml/2006/main" xmlns:r="http://schemas.openxmlformats.org/officeDocument/2006/relationships" xmlns:p="http://schemas.openxmlformats.org/presentationml/2006/main">
   <p:cSld>
     <p:spTree>

</xml_diff>